<commit_message>
plot and model folder structered and reorganised
</commit_message>
<xml_diff>
--- a/Project_presentation.pptx
+++ b/Project_presentation.pptx
@@ -17,10 +17,10 @@
     <p:sldId id="269" r:id="rId11"/>
     <p:sldId id="270" r:id="rId12"/>
     <p:sldId id="271" r:id="rId13"/>
-    <p:sldId id="272" r:id="rId14"/>
-    <p:sldId id="275" r:id="rId15"/>
-    <p:sldId id="273" r:id="rId16"/>
-    <p:sldId id="277" r:id="rId17"/>
+    <p:sldId id="275" r:id="rId14"/>
+    <p:sldId id="273" r:id="rId15"/>
+    <p:sldId id="277" r:id="rId16"/>
+    <p:sldId id="278" r:id="rId17"/>
     <p:sldId id="274" r:id="rId18"/>
   </p:sldIdLst>
   <p:sldSz cx="12192000" cy="6858000"/>
@@ -3752,7 +3752,7 @@
           <a:p>
             <a:r>
               <a:rPr lang="fr-LU" dirty="0"/>
-              <a:t>XGB-Boost</a:t>
+              <a:t>XGB-Boost </a:t>
             </a:r>
           </a:p>
           <a:p>
@@ -3817,7 +3817,7 @@
           <p:cNvPr id="2" name="Titel 1">
             <a:extLst>
               <a:ext uri="{FF2B5EF4-FFF2-40B4-BE49-F238E27FC236}">
-                <a16:creationId xmlns:a16="http://schemas.microsoft.com/office/drawing/2014/main" id="{B44D10FB-4FD9-2817-578F-95BDBE89B852}"/>
+                <a16:creationId xmlns:a16="http://schemas.microsoft.com/office/drawing/2014/main" id="{E94B20FA-071A-651F-7BFB-68CE743269A1}"/>
               </a:ext>
             </a:extLst>
           </p:cNvPr>
@@ -3848,7 +3848,7 @@
             </a:r>
             <a:r>
               <a:rPr lang="fr-LU" dirty="0"/>
-              <a:t> -Speed</a:t>
+              <a:t> –Flow</a:t>
             </a:r>
             <a:br>
               <a:rPr lang="fr-LU" dirty="0"/>
@@ -3857,39 +3857,783 @@
               <a:rPr lang="fr-LU" sz="1600" dirty="0"/>
               <a:t>04:15-10:00</a:t>
             </a:r>
+          </a:p>
+        </p:txBody>
+      </p:sp>
+      <p:sp>
+        <p:nvSpPr>
+          <p:cNvPr id="3" name="Inhaltsplatzhalter 2">
+            <a:extLst>
+              <a:ext uri="{FF2B5EF4-FFF2-40B4-BE49-F238E27FC236}">
+                <a16:creationId xmlns:a16="http://schemas.microsoft.com/office/drawing/2014/main" id="{1C9A7D8C-BB3E-8DC0-5505-0179F1C596C6}"/>
+              </a:ext>
+            </a:extLst>
+          </p:cNvPr>
+          <p:cNvSpPr>
+            <a:spLocks noGrp="1"/>
+          </p:cNvSpPr>
+          <p:nvPr>
+            <p:ph idx="1"/>
+          </p:nvPr>
+        </p:nvSpPr>
+        <p:spPr/>
+        <p:txBody>
+          <a:bodyPr>
+            <a:normAutofit lnSpcReduction="10000"/>
+          </a:bodyPr>
+          <a:lstStyle/>
+          <a:p>
+            <a:r>
+              <a:rPr lang="fr-LU" dirty="0"/>
+              <a:t>MAE:</a:t>
+            </a:r>
+          </a:p>
+          <a:p>
             <a:endParaRPr lang="fr-LU" dirty="0"/>
           </a:p>
-        </p:txBody>
-      </p:sp>
-      <p:sp>
-        <p:nvSpPr>
-          <p:cNvPr id="9" name="Inhaltsplatzhalter 8">
-            <a:extLst>
-              <a:ext uri="{FF2B5EF4-FFF2-40B4-BE49-F238E27FC236}">
-                <a16:creationId xmlns:a16="http://schemas.microsoft.com/office/drawing/2014/main" id="{981EE775-744B-E609-2158-DAAC2082E9B7}"/>
-              </a:ext>
-            </a:extLst>
-          </p:cNvPr>
-          <p:cNvSpPr>
-            <a:spLocks noGrp="1"/>
-          </p:cNvSpPr>
-          <p:nvPr>
-            <p:ph idx="1"/>
-          </p:nvPr>
-        </p:nvSpPr>
-        <p:spPr/>
-        <p:txBody>
-          <a:bodyPr/>
-          <a:lstStyle/>
           <a:p>
             <a:endParaRPr lang="fr-LU" dirty="0"/>
           </a:p>
-        </p:txBody>
-      </p:sp>
+          <a:p>
+            <a:endParaRPr lang="fr-LU" dirty="0"/>
+          </a:p>
+          <a:p>
+            <a:endParaRPr lang="fr-LU" dirty="0"/>
+          </a:p>
+          <a:p>
+            <a:endParaRPr lang="fr-LU" dirty="0"/>
+          </a:p>
+          <a:p>
+            <a:endParaRPr lang="fr-LU" dirty="0"/>
+          </a:p>
+          <a:p>
+            <a:pPr marL="0" indent="0">
+              <a:buNone/>
+            </a:pPr>
+            <a:r>
+              <a:rPr lang="fr-LU" dirty="0">
+                <a:sym typeface="Wingdings" panose="05000000000000000000" pitchFamily="2" charset="2"/>
+              </a:rPr>
+              <a:t></a:t>
+            </a:r>
+            <a:r>
+              <a:rPr lang="fr-LU" dirty="0" err="1">
+                <a:sym typeface="Wingdings" panose="05000000000000000000" pitchFamily="2" charset="2"/>
+              </a:rPr>
+              <a:t>neighbour</a:t>
+            </a:r>
+            <a:r>
+              <a:rPr lang="fr-LU" dirty="0">
+                <a:sym typeface="Wingdings" panose="05000000000000000000" pitchFamily="2" charset="2"/>
+              </a:rPr>
+              <a:t> portal </a:t>
+            </a:r>
+            <a:r>
+              <a:rPr lang="fr-LU" dirty="0" err="1">
+                <a:sym typeface="Wingdings" panose="05000000000000000000" pitchFamily="2" charset="2"/>
+              </a:rPr>
+              <a:t>is</a:t>
+            </a:r>
+            <a:r>
+              <a:rPr lang="fr-LU" dirty="0">
+                <a:sym typeface="Wingdings" panose="05000000000000000000" pitchFamily="2" charset="2"/>
+              </a:rPr>
+              <a:t> </a:t>
+            </a:r>
+            <a:r>
+              <a:rPr lang="fr-LU" dirty="0" err="1">
+                <a:sym typeface="Wingdings" panose="05000000000000000000" pitchFamily="2" charset="2"/>
+              </a:rPr>
+              <a:t>better</a:t>
+            </a:r>
+            <a:r>
+              <a:rPr lang="fr-LU" dirty="0">
+                <a:sym typeface="Wingdings" panose="05000000000000000000" pitchFamily="2" charset="2"/>
+              </a:rPr>
+              <a:t> for </a:t>
+            </a:r>
+            <a:r>
+              <a:rPr lang="fr-LU" dirty="0" err="1">
+                <a:sym typeface="Wingdings" panose="05000000000000000000" pitchFamily="2" charset="2"/>
+              </a:rPr>
+              <a:t>prediction</a:t>
+            </a:r>
+            <a:endParaRPr lang="fr-LU" dirty="0">
+              <a:sym typeface="Wingdings" panose="05000000000000000000" pitchFamily="2" charset="2"/>
+            </a:endParaRPr>
+          </a:p>
+          <a:p>
+            <a:pPr marL="0" indent="0">
+              <a:buNone/>
+            </a:pPr>
+            <a:r>
+              <a:rPr lang="fr-LU" dirty="0">
+                <a:sym typeface="Wingdings" panose="05000000000000000000" pitchFamily="2" charset="2"/>
+              </a:rPr>
+              <a:t></a:t>
+            </a:r>
+            <a:r>
+              <a:rPr lang="fr-LU" dirty="0" err="1">
+                <a:sym typeface="Wingdings" panose="05000000000000000000" pitchFamily="2" charset="2"/>
+              </a:rPr>
+              <a:t>XGBoost</a:t>
+            </a:r>
+            <a:r>
+              <a:rPr lang="fr-LU" dirty="0">
+                <a:sym typeface="Wingdings" panose="05000000000000000000" pitchFamily="2" charset="2"/>
+              </a:rPr>
+              <a:t> </a:t>
+            </a:r>
+            <a:r>
+              <a:rPr lang="fr-LU" dirty="0" err="1">
+                <a:sym typeface="Wingdings" panose="05000000000000000000" pitchFamily="2" charset="2"/>
+              </a:rPr>
+              <a:t>gives</a:t>
+            </a:r>
+            <a:r>
+              <a:rPr lang="fr-LU" dirty="0">
+                <a:sym typeface="Wingdings" panose="05000000000000000000" pitchFamily="2" charset="2"/>
+              </a:rPr>
+              <a:t> best </a:t>
+            </a:r>
+            <a:r>
+              <a:rPr lang="fr-LU" dirty="0" err="1">
+                <a:sym typeface="Wingdings" panose="05000000000000000000" pitchFamily="2" charset="2"/>
+              </a:rPr>
+              <a:t>result</a:t>
+            </a:r>
+            <a:endParaRPr lang="fr-LU" dirty="0"/>
+          </a:p>
+        </p:txBody>
+      </p:sp>
+      <p:graphicFrame>
+        <p:nvGraphicFramePr>
+          <p:cNvPr id="4" name="Tabelle 3">
+            <a:extLst>
+              <a:ext uri="{FF2B5EF4-FFF2-40B4-BE49-F238E27FC236}">
+                <a16:creationId xmlns:a16="http://schemas.microsoft.com/office/drawing/2014/main" id="{4127B256-4A41-12E4-B3CC-BB9FB8265658}"/>
+              </a:ext>
+            </a:extLst>
+          </p:cNvPr>
+          <p:cNvGraphicFramePr>
+            <a:graphicFrameLocks noGrp="1"/>
+          </p:cNvGraphicFramePr>
+          <p:nvPr>
+            <p:extLst>
+              <p:ext uri="{D42A27DB-BD31-4B8C-83A1-F6EECF244321}">
+                <p14:modId xmlns:p14="http://schemas.microsoft.com/office/powerpoint/2010/main" val="2826779448"/>
+              </p:ext>
+            </p:extLst>
+          </p:nvPr>
+        </p:nvGraphicFramePr>
+        <p:xfrm>
+          <a:off x="1697182" y="2202871"/>
+          <a:ext cx="7665522" cy="2662182"/>
+        </p:xfrm>
+        <a:graphic>
+          <a:graphicData uri="http://schemas.openxmlformats.org/drawingml/2006/table">
+            <a:tbl>
+              <a:tblPr>
+                <a:tableStyleId>{5C22544A-7EE6-4342-B048-85BDC9FD1C3A}</a:tableStyleId>
+              </a:tblPr>
+              <a:tblGrid>
+                <a:gridCol w="1277587">
+                  <a:extLst>
+                    <a:ext uri="{9D8B030D-6E8A-4147-A177-3AD203B41FA5}">
+                      <a16:colId xmlns:a16="http://schemas.microsoft.com/office/drawing/2014/main" val="4085663618"/>
+                    </a:ext>
+                  </a:extLst>
+                </a:gridCol>
+                <a:gridCol w="1277587">
+                  <a:extLst>
+                    <a:ext uri="{9D8B030D-6E8A-4147-A177-3AD203B41FA5}">
+                      <a16:colId xmlns:a16="http://schemas.microsoft.com/office/drawing/2014/main" val="3185506048"/>
+                    </a:ext>
+                  </a:extLst>
+                </a:gridCol>
+                <a:gridCol w="1277587">
+                  <a:extLst>
+                    <a:ext uri="{9D8B030D-6E8A-4147-A177-3AD203B41FA5}">
+                      <a16:colId xmlns:a16="http://schemas.microsoft.com/office/drawing/2014/main" val="836826125"/>
+                    </a:ext>
+                  </a:extLst>
+                </a:gridCol>
+                <a:gridCol w="1277587">
+                  <a:extLst>
+                    <a:ext uri="{9D8B030D-6E8A-4147-A177-3AD203B41FA5}">
+                      <a16:colId xmlns:a16="http://schemas.microsoft.com/office/drawing/2014/main" val="3482112081"/>
+                    </a:ext>
+                  </a:extLst>
+                </a:gridCol>
+                <a:gridCol w="1277587">
+                  <a:extLst>
+                    <a:ext uri="{9D8B030D-6E8A-4147-A177-3AD203B41FA5}">
+                      <a16:colId xmlns:a16="http://schemas.microsoft.com/office/drawing/2014/main" val="1690176965"/>
+                    </a:ext>
+                  </a:extLst>
+                </a:gridCol>
+                <a:gridCol w="1277587">
+                  <a:extLst>
+                    <a:ext uri="{9D8B030D-6E8A-4147-A177-3AD203B41FA5}">
+                      <a16:colId xmlns:a16="http://schemas.microsoft.com/office/drawing/2014/main" val="2241168061"/>
+                    </a:ext>
+                  </a:extLst>
+                </a:gridCol>
+              </a:tblGrid>
+              <a:tr h="1023116">
+                <a:tc>
+                  <a:txBody>
+                    <a:bodyPr/>
+                    <a:lstStyle/>
+                    <a:p>
+                      <a:pPr algn="ctr" fontAlgn="b">
+                        <a:buNone/>
+                      </a:pPr>
+                      <a:endParaRPr lang="de-LU" sz="2000" b="0" i="0" u="none" strike="noStrike" dirty="0">
+                        <a:solidFill>
+                          <a:srgbClr val="000000"/>
+                        </a:solidFill>
+                        <a:effectLst/>
+                        <a:latin typeface="Aptos Narrow" panose="020B0004020202020204" pitchFamily="34" charset="0"/>
+                      </a:endParaRPr>
+                    </a:p>
+                  </a:txBody>
+                  <a:tcPr marL="6350" marR="6350" marT="6350" marB="0" anchor="b">
+                    <a:solidFill>
+                      <a:schemeClr val="tx2">
+                        <a:lumMod val="25000"/>
+                        <a:lumOff val="75000"/>
+                      </a:schemeClr>
+                    </a:solidFill>
+                  </a:tcPr>
+                </a:tc>
+                <a:tc>
+                  <a:txBody>
+                    <a:bodyPr/>
+                    <a:lstStyle/>
+                    <a:p>
+                      <a:pPr algn="ctr" fontAlgn="b">
+                        <a:buNone/>
+                      </a:pPr>
+                      <a:r>
+                        <a:rPr lang="de-LU" sz="2000" u="none" strike="noStrike" dirty="0">
+                          <a:effectLst/>
+                        </a:rPr>
+                        <a:t>Linear Regression</a:t>
+                      </a:r>
+                      <a:endParaRPr lang="de-LU" sz="2000" b="0" i="0" u="none" strike="noStrike" dirty="0">
+                        <a:solidFill>
+                          <a:srgbClr val="000000"/>
+                        </a:solidFill>
+                        <a:effectLst/>
+                        <a:latin typeface="Aptos Narrow" panose="020B0004020202020204" pitchFamily="34" charset="0"/>
+                      </a:endParaRPr>
+                    </a:p>
+                  </a:txBody>
+                  <a:tcPr marL="6350" marR="6350" marT="6350" marB="0" anchor="b">
+                    <a:solidFill>
+                      <a:schemeClr val="tx2">
+                        <a:lumMod val="25000"/>
+                        <a:lumOff val="75000"/>
+                      </a:schemeClr>
+                    </a:solidFill>
+                  </a:tcPr>
+                </a:tc>
+                <a:tc>
+                  <a:txBody>
+                    <a:bodyPr/>
+                    <a:lstStyle/>
+                    <a:p>
+                      <a:pPr algn="ctr" fontAlgn="b">
+                        <a:buNone/>
+                      </a:pPr>
+                      <a:r>
+                        <a:rPr lang="de-LU" sz="2000" u="none" strike="noStrike" dirty="0" err="1">
+                          <a:effectLst/>
+                        </a:rPr>
+                        <a:t>Xgboost</a:t>
+                      </a:r>
+                      <a:endParaRPr lang="de-LU" sz="2000" b="0" i="0" u="none" strike="noStrike" dirty="0">
+                        <a:solidFill>
+                          <a:srgbClr val="000000"/>
+                        </a:solidFill>
+                        <a:effectLst/>
+                        <a:latin typeface="Aptos Narrow" panose="020B0004020202020204" pitchFamily="34" charset="0"/>
+                      </a:endParaRPr>
+                    </a:p>
+                  </a:txBody>
+                  <a:tcPr marL="6350" marR="6350" marT="6350" marB="0" anchor="b">
+                    <a:solidFill>
+                      <a:schemeClr val="tx2">
+                        <a:lumMod val="25000"/>
+                        <a:lumOff val="75000"/>
+                      </a:schemeClr>
+                    </a:solidFill>
+                  </a:tcPr>
+                </a:tc>
+                <a:tc>
+                  <a:txBody>
+                    <a:bodyPr/>
+                    <a:lstStyle/>
+                    <a:p>
+                      <a:pPr algn="ctr" fontAlgn="b">
+                        <a:buNone/>
+                      </a:pPr>
+                      <a:r>
+                        <a:rPr lang="de-LU" sz="2000" u="none" strike="noStrike" dirty="0" err="1">
+                          <a:effectLst/>
+                        </a:rPr>
+                        <a:t>Xgboost-randomSearch</a:t>
+                      </a:r>
+                      <a:endParaRPr lang="de-LU" sz="2000" b="0" i="0" u="none" strike="noStrike" dirty="0">
+                        <a:solidFill>
+                          <a:srgbClr val="000000"/>
+                        </a:solidFill>
+                        <a:effectLst/>
+                        <a:latin typeface="Aptos Narrow" panose="020B0004020202020204" pitchFamily="34" charset="0"/>
+                      </a:endParaRPr>
+                    </a:p>
+                  </a:txBody>
+                  <a:tcPr marL="6350" marR="6350" marT="6350" marB="0" anchor="b">
+                    <a:solidFill>
+                      <a:schemeClr val="tx2">
+                        <a:lumMod val="25000"/>
+                        <a:lumOff val="75000"/>
+                      </a:schemeClr>
+                    </a:solidFill>
+                  </a:tcPr>
+                </a:tc>
+                <a:tc>
+                  <a:txBody>
+                    <a:bodyPr/>
+                    <a:lstStyle/>
+                    <a:p>
+                      <a:pPr algn="ctr" fontAlgn="b">
+                        <a:buNone/>
+                      </a:pPr>
+                      <a:r>
+                        <a:rPr lang="de-LU" sz="2000" u="none" strike="noStrike" dirty="0">
+                          <a:effectLst/>
+                        </a:rPr>
+                        <a:t>NN</a:t>
+                      </a:r>
+                      <a:endParaRPr lang="de-LU" sz="2000" b="0" i="0" u="none" strike="noStrike" dirty="0">
+                        <a:solidFill>
+                          <a:srgbClr val="000000"/>
+                        </a:solidFill>
+                        <a:effectLst/>
+                        <a:latin typeface="Aptos Narrow" panose="020B0004020202020204" pitchFamily="34" charset="0"/>
+                      </a:endParaRPr>
+                    </a:p>
+                  </a:txBody>
+                  <a:tcPr marL="6350" marR="6350" marT="6350" marB="0" anchor="b">
+                    <a:solidFill>
+                      <a:schemeClr val="tx2">
+                        <a:lumMod val="25000"/>
+                        <a:lumOff val="75000"/>
+                      </a:schemeClr>
+                    </a:solidFill>
+                  </a:tcPr>
+                </a:tc>
+                <a:tc>
+                  <a:txBody>
+                    <a:bodyPr/>
+                    <a:lstStyle/>
+                    <a:p>
+                      <a:pPr algn="ctr" fontAlgn="b">
+                        <a:buNone/>
+                      </a:pPr>
+                      <a:r>
+                        <a:rPr lang="de-LU" sz="2000" u="none" strike="noStrike" dirty="0">
+                          <a:effectLst/>
+                        </a:rPr>
+                        <a:t>NN-</a:t>
+                      </a:r>
+                      <a:r>
+                        <a:rPr lang="de-LU" sz="2000" u="none" strike="noStrike" dirty="0" err="1">
+                          <a:effectLst/>
+                        </a:rPr>
+                        <a:t>grid</a:t>
+                      </a:r>
+                      <a:r>
+                        <a:rPr lang="de-LU" sz="2000" u="none" strike="noStrike" dirty="0">
+                          <a:effectLst/>
+                        </a:rPr>
+                        <a:t> </a:t>
+                      </a:r>
+                      <a:r>
+                        <a:rPr lang="de-LU" sz="2000" u="none" strike="noStrike" dirty="0" err="1">
+                          <a:effectLst/>
+                        </a:rPr>
+                        <a:t>search</a:t>
+                      </a:r>
+                      <a:endParaRPr lang="de-LU" sz="2000" b="0" i="0" u="none" strike="noStrike" dirty="0">
+                        <a:solidFill>
+                          <a:srgbClr val="000000"/>
+                        </a:solidFill>
+                        <a:effectLst/>
+                        <a:latin typeface="Aptos Narrow" panose="020B0004020202020204" pitchFamily="34" charset="0"/>
+                      </a:endParaRPr>
+                    </a:p>
+                  </a:txBody>
+                  <a:tcPr marL="6350" marR="6350" marT="6350" marB="0" anchor="b">
+                    <a:solidFill>
+                      <a:schemeClr val="tx2">
+                        <a:lumMod val="25000"/>
+                        <a:lumOff val="75000"/>
+                      </a:schemeClr>
+                    </a:solidFill>
+                  </a:tcPr>
+                </a:tc>
+                <a:extLst>
+                  <a:ext uri="{0D108BD9-81ED-4DB2-BD59-A6C34878D82A}">
+                    <a16:rowId xmlns:a16="http://schemas.microsoft.com/office/drawing/2014/main" val="1262727926"/>
+                  </a:ext>
+                </a:extLst>
+              </a:tr>
+              <a:tr h="551494">
+                <a:tc>
+                  <a:txBody>
+                    <a:bodyPr/>
+                    <a:lstStyle/>
+                    <a:p>
+                      <a:pPr algn="ctr" fontAlgn="b">
+                        <a:buNone/>
+                      </a:pPr>
+                      <a:r>
+                        <a:rPr lang="de-LU" sz="2000" u="none" strike="noStrike" dirty="0">
+                          <a:effectLst/>
+                        </a:rPr>
+                        <a:t>Same Portal</a:t>
+                      </a:r>
+                      <a:endParaRPr lang="de-LU" sz="2000" b="0" i="0" u="none" strike="noStrike" dirty="0">
+                        <a:solidFill>
+                          <a:srgbClr val="000000"/>
+                        </a:solidFill>
+                        <a:effectLst/>
+                        <a:latin typeface="Aptos Narrow" panose="020B0004020202020204" pitchFamily="34" charset="0"/>
+                      </a:endParaRPr>
+                    </a:p>
+                  </a:txBody>
+                  <a:tcPr marL="6350" marR="6350" marT="6350" marB="0" anchor="b">
+                    <a:solidFill>
+                      <a:schemeClr val="tx2">
+                        <a:lumMod val="25000"/>
+                        <a:lumOff val="75000"/>
+                      </a:schemeClr>
+                    </a:solidFill>
+                  </a:tcPr>
+                </a:tc>
+                <a:tc>
+                  <a:txBody>
+                    <a:bodyPr/>
+                    <a:lstStyle/>
+                    <a:p>
+                      <a:pPr algn="ctr" fontAlgn="b">
+                        <a:buNone/>
+                      </a:pPr>
+                      <a:r>
+                        <a:rPr lang="de-LU" sz="2000" u="none" strike="noStrike">
+                          <a:effectLst/>
+                        </a:rPr>
+                        <a:t>23,809</a:t>
+                      </a:r>
+                      <a:endParaRPr lang="de-LU" sz="2000" b="0" i="0" u="none" strike="noStrike">
+                        <a:solidFill>
+                          <a:srgbClr val="000000"/>
+                        </a:solidFill>
+                        <a:effectLst/>
+                        <a:latin typeface="Aptos Narrow" panose="020B0004020202020204" pitchFamily="34" charset="0"/>
+                      </a:endParaRPr>
+                    </a:p>
+                  </a:txBody>
+                  <a:tcPr marL="6350" marR="6350" marT="6350" marB="0" anchor="b"/>
+                </a:tc>
+                <a:tc>
+                  <a:txBody>
+                    <a:bodyPr/>
+                    <a:lstStyle/>
+                    <a:p>
+                      <a:pPr algn="ctr" fontAlgn="b">
+                        <a:buNone/>
+                      </a:pPr>
+                      <a:r>
+                        <a:rPr lang="de-LU" sz="2000" u="none" strike="noStrike">
+                          <a:effectLst/>
+                        </a:rPr>
+                        <a:t>20,634</a:t>
+                      </a:r>
+                      <a:endParaRPr lang="de-LU" sz="2000" b="0" i="0" u="none" strike="noStrike">
+                        <a:solidFill>
+                          <a:srgbClr val="000000"/>
+                        </a:solidFill>
+                        <a:effectLst/>
+                        <a:latin typeface="Aptos Narrow" panose="020B0004020202020204" pitchFamily="34" charset="0"/>
+                      </a:endParaRPr>
+                    </a:p>
+                  </a:txBody>
+                  <a:tcPr marL="6350" marR="6350" marT="6350" marB="0" anchor="b"/>
+                </a:tc>
+                <a:tc>
+                  <a:txBody>
+                    <a:bodyPr/>
+                    <a:lstStyle/>
+                    <a:p>
+                      <a:pPr algn="ctr" fontAlgn="b">
+                        <a:buNone/>
+                      </a:pPr>
+                      <a:r>
+                        <a:rPr lang="de-LU" sz="2000" u="none" strike="noStrike">
+                          <a:effectLst/>
+                        </a:rPr>
+                        <a:t>20,321</a:t>
+                      </a:r>
+                      <a:endParaRPr lang="de-LU" sz="2000" b="0" i="0" u="none" strike="noStrike">
+                        <a:solidFill>
+                          <a:srgbClr val="000000"/>
+                        </a:solidFill>
+                        <a:effectLst/>
+                        <a:latin typeface="Aptos Narrow" panose="020B0004020202020204" pitchFamily="34" charset="0"/>
+                      </a:endParaRPr>
+                    </a:p>
+                  </a:txBody>
+                  <a:tcPr marL="6350" marR="6350" marT="6350" marB="0" anchor="b"/>
+                </a:tc>
+                <a:tc>
+                  <a:txBody>
+                    <a:bodyPr/>
+                    <a:lstStyle/>
+                    <a:p>
+                      <a:pPr algn="ctr" fontAlgn="b">
+                        <a:buNone/>
+                      </a:pPr>
+                      <a:r>
+                        <a:rPr lang="de-LU" sz="2000" u="none" strike="noStrike">
+                          <a:effectLst/>
+                        </a:rPr>
+                        <a:t>20,952</a:t>
+                      </a:r>
+                      <a:endParaRPr lang="de-LU" sz="2000" b="0" i="0" u="none" strike="noStrike">
+                        <a:solidFill>
+                          <a:srgbClr val="000000"/>
+                        </a:solidFill>
+                        <a:effectLst/>
+                        <a:latin typeface="Aptos Narrow" panose="020B0004020202020204" pitchFamily="34" charset="0"/>
+                      </a:endParaRPr>
+                    </a:p>
+                  </a:txBody>
+                  <a:tcPr marL="6350" marR="6350" marT="6350" marB="0" anchor="b"/>
+                </a:tc>
+                <a:tc>
+                  <a:txBody>
+                    <a:bodyPr/>
+                    <a:lstStyle/>
+                    <a:p>
+                      <a:pPr algn="ctr" fontAlgn="b">
+                        <a:buNone/>
+                      </a:pPr>
+                      <a:r>
+                        <a:rPr lang="de-LU" sz="2000" u="none" strike="noStrike">
+                          <a:effectLst/>
+                        </a:rPr>
+                        <a:t>20,481</a:t>
+                      </a:r>
+                      <a:endParaRPr lang="de-LU" sz="2000" b="0" i="0" u="none" strike="noStrike">
+                        <a:solidFill>
+                          <a:srgbClr val="000000"/>
+                        </a:solidFill>
+                        <a:effectLst/>
+                        <a:latin typeface="Aptos Narrow" panose="020B0004020202020204" pitchFamily="34" charset="0"/>
+                      </a:endParaRPr>
+                    </a:p>
+                  </a:txBody>
+                  <a:tcPr marL="6350" marR="6350" marT="6350" marB="0" anchor="b"/>
+                </a:tc>
+                <a:extLst>
+                  <a:ext uri="{0D108BD9-81ED-4DB2-BD59-A6C34878D82A}">
+                    <a16:rowId xmlns:a16="http://schemas.microsoft.com/office/drawing/2014/main" val="563146801"/>
+                  </a:ext>
+                </a:extLst>
+              </a:tr>
+              <a:tr h="1023116">
+                <a:tc>
+                  <a:txBody>
+                    <a:bodyPr/>
+                    <a:lstStyle/>
+                    <a:p>
+                      <a:pPr algn="ctr" fontAlgn="b">
+                        <a:buNone/>
+                      </a:pPr>
+                      <a:r>
+                        <a:rPr lang="de-LU" sz="2000" b="0" i="0" u="none" strike="noStrike" dirty="0" err="1">
+                          <a:solidFill>
+                            <a:srgbClr val="000000"/>
+                          </a:solidFill>
+                          <a:effectLst/>
+                          <a:latin typeface="Aptos Narrow" panose="020B0004020202020204" pitchFamily="34" charset="0"/>
+                        </a:rPr>
+                        <a:t>Neighbour</a:t>
+                      </a:r>
+                      <a:r>
+                        <a:rPr lang="de-LU" sz="2000" b="0" i="0" u="none" strike="noStrike" dirty="0">
+                          <a:solidFill>
+                            <a:srgbClr val="000000"/>
+                          </a:solidFill>
+                          <a:effectLst/>
+                          <a:latin typeface="Aptos Narrow" panose="020B0004020202020204" pitchFamily="34" charset="0"/>
+                        </a:rPr>
+                        <a:t> Portal</a:t>
+                      </a:r>
+                    </a:p>
+                  </a:txBody>
+                  <a:tcPr marL="6350" marR="6350" marT="6350" marB="0" anchor="b">
+                    <a:solidFill>
+                      <a:schemeClr val="tx2">
+                        <a:lumMod val="25000"/>
+                        <a:lumOff val="75000"/>
+                      </a:schemeClr>
+                    </a:solidFill>
+                  </a:tcPr>
+                </a:tc>
+                <a:tc>
+                  <a:txBody>
+                    <a:bodyPr/>
+                    <a:lstStyle/>
+                    <a:p>
+                      <a:pPr algn="ctr" fontAlgn="b">
+                        <a:buNone/>
+                      </a:pPr>
+                      <a:r>
+                        <a:rPr lang="de-LU" sz="2000" u="none" strike="noStrike">
+                          <a:effectLst/>
+                        </a:rPr>
+                        <a:t>23,297</a:t>
+                      </a:r>
+                      <a:endParaRPr lang="de-LU" sz="2000" b="0" i="0" u="none" strike="noStrike">
+                        <a:solidFill>
+                          <a:srgbClr val="000000"/>
+                        </a:solidFill>
+                        <a:effectLst/>
+                        <a:latin typeface="Aptos Narrow" panose="020B0004020202020204" pitchFamily="34" charset="0"/>
+                      </a:endParaRPr>
+                    </a:p>
+                  </a:txBody>
+                  <a:tcPr marL="6350" marR="6350" marT="6350" marB="0" anchor="b"/>
+                </a:tc>
+                <a:tc>
+                  <a:txBody>
+                    <a:bodyPr/>
+                    <a:lstStyle/>
+                    <a:p>
+                      <a:pPr algn="ctr" fontAlgn="b">
+                        <a:buNone/>
+                      </a:pPr>
+                      <a:r>
+                        <a:rPr lang="de-LU" sz="2000" u="none" strike="noStrike" dirty="0">
+                          <a:effectLst/>
+                        </a:rPr>
+                        <a:t>17,192</a:t>
+                      </a:r>
+                      <a:endParaRPr lang="de-LU" sz="2000" b="0" i="0" u="none" strike="noStrike" dirty="0">
+                        <a:solidFill>
+                          <a:srgbClr val="000000"/>
+                        </a:solidFill>
+                        <a:effectLst/>
+                        <a:latin typeface="Aptos Narrow" panose="020B0004020202020204" pitchFamily="34" charset="0"/>
+                      </a:endParaRPr>
+                    </a:p>
+                  </a:txBody>
+                  <a:tcPr marL="6350" marR="6350" marT="6350" marB="0" anchor="b"/>
+                </a:tc>
+                <a:tc>
+                  <a:txBody>
+                    <a:bodyPr/>
+                    <a:lstStyle/>
+                    <a:p>
+                      <a:pPr algn="ctr" fontAlgn="b">
+                        <a:buNone/>
+                      </a:pPr>
+                      <a:r>
+                        <a:rPr lang="de-LU" sz="2000" u="none" strike="noStrike" dirty="0">
+                          <a:effectLst/>
+                        </a:rPr>
+                        <a:t>17,026</a:t>
+                      </a:r>
+                      <a:endParaRPr lang="de-LU" sz="2000" b="0" i="0" u="none" strike="noStrike" dirty="0">
+                        <a:solidFill>
+                          <a:srgbClr val="000000"/>
+                        </a:solidFill>
+                        <a:effectLst/>
+                        <a:latin typeface="Aptos Narrow" panose="020B0004020202020204" pitchFamily="34" charset="0"/>
+                      </a:endParaRPr>
+                    </a:p>
+                  </a:txBody>
+                  <a:tcPr marL="6350" marR="6350" marT="6350" marB="0" anchor="b"/>
+                </a:tc>
+                <a:tc>
+                  <a:txBody>
+                    <a:bodyPr/>
+                    <a:lstStyle/>
+                    <a:p>
+                      <a:pPr algn="ctr" fontAlgn="b">
+                        <a:buNone/>
+                      </a:pPr>
+                      <a:r>
+                        <a:rPr lang="de-LU" sz="2000" u="none" strike="noStrike" dirty="0">
+                          <a:effectLst/>
+                        </a:rPr>
+                        <a:t>17,504</a:t>
+                      </a:r>
+                      <a:endParaRPr lang="de-LU" sz="2000" b="0" i="0" u="none" strike="noStrike" dirty="0">
+                        <a:solidFill>
+                          <a:srgbClr val="000000"/>
+                        </a:solidFill>
+                        <a:effectLst/>
+                        <a:latin typeface="Aptos Narrow" panose="020B0004020202020204" pitchFamily="34" charset="0"/>
+                      </a:endParaRPr>
+                    </a:p>
+                  </a:txBody>
+                  <a:tcPr marL="6350" marR="6350" marT="6350" marB="0" anchor="b"/>
+                </a:tc>
+                <a:tc>
+                  <a:txBody>
+                    <a:bodyPr/>
+                    <a:lstStyle/>
+                    <a:p>
+                      <a:pPr algn="ctr" fontAlgn="b">
+                        <a:buNone/>
+                      </a:pPr>
+                      <a:r>
+                        <a:rPr lang="de-LU" sz="2000" u="none" strike="noStrike" dirty="0">
+                          <a:effectLst/>
+                        </a:rPr>
+                        <a:t>17,286</a:t>
+                      </a:r>
+                      <a:endParaRPr lang="de-LU" sz="2000" b="0" i="0" u="none" strike="noStrike" dirty="0">
+                        <a:solidFill>
+                          <a:srgbClr val="000000"/>
+                        </a:solidFill>
+                        <a:effectLst/>
+                        <a:latin typeface="Aptos Narrow" panose="020B0004020202020204" pitchFamily="34" charset="0"/>
+                      </a:endParaRPr>
+                    </a:p>
+                  </a:txBody>
+                  <a:tcPr marL="6350" marR="6350" marT="6350" marB="0" anchor="b"/>
+                </a:tc>
+                <a:extLst>
+                  <a:ext uri="{0D108BD9-81ED-4DB2-BD59-A6C34878D82A}">
+                    <a16:rowId xmlns:a16="http://schemas.microsoft.com/office/drawing/2014/main" val="3779909210"/>
+                  </a:ext>
+                </a:extLst>
+              </a:tr>
+            </a:tbl>
+          </a:graphicData>
+        </a:graphic>
+      </p:graphicFrame>
     </p:spTree>
     <p:extLst>
       <p:ext uri="{BB962C8B-B14F-4D97-AF65-F5344CB8AC3E}">
-        <p14:creationId xmlns:p14="http://schemas.microsoft.com/office/powerpoint/2010/main" val="1567167523"/>
+        <p14:creationId xmlns:p14="http://schemas.microsoft.com/office/powerpoint/2010/main" val="2429169769"/>
       </p:ext>
     </p:extLst>
   </p:cSld>
@@ -3921,7 +4665,7 @@
           <p:cNvPr id="2" name="Titel 1">
             <a:extLst>
               <a:ext uri="{FF2B5EF4-FFF2-40B4-BE49-F238E27FC236}">
-                <a16:creationId xmlns:a16="http://schemas.microsoft.com/office/drawing/2014/main" id="{E94B20FA-071A-651F-7BFB-68CE743269A1}"/>
+                <a16:creationId xmlns:a16="http://schemas.microsoft.com/office/drawing/2014/main" id="{B1879587-B17B-A420-C1F2-4E951611127F}"/>
               </a:ext>
             </a:extLst>
           </p:cNvPr>
@@ -3952,7 +4696,7 @@
             </a:r>
             <a:r>
               <a:rPr lang="fr-LU" dirty="0"/>
-              <a:t> –Flow</a:t>
+              <a:t> -Speed</a:t>
             </a:r>
             <a:br>
               <a:rPr lang="fr-LU" dirty="0"/>
@@ -3961,6 +4705,7 @@
               <a:rPr lang="fr-LU" sz="1600" dirty="0"/>
               <a:t>04:15-10:00</a:t>
             </a:r>
+            <a:endParaRPr lang="fr-LU" sz="2000" dirty="0"/>
           </a:p>
         </p:txBody>
       </p:sp>
@@ -3969,7 +4714,7 @@
           <p:cNvPr id="3" name="Inhaltsplatzhalter 2">
             <a:extLst>
               <a:ext uri="{FF2B5EF4-FFF2-40B4-BE49-F238E27FC236}">
-                <a16:creationId xmlns:a16="http://schemas.microsoft.com/office/drawing/2014/main" id="{1C9A7D8C-BB3E-8DC0-5505-0179F1C596C6}"/>
+                <a16:creationId xmlns:a16="http://schemas.microsoft.com/office/drawing/2014/main" id="{8AF2C04B-39FF-2CDA-DDF8-02B581BA28C1}"/>
               </a:ext>
             </a:extLst>
           </p:cNvPr>
@@ -3982,112 +4727,780 @@
         </p:nvSpPr>
         <p:spPr/>
         <p:txBody>
-          <a:bodyPr/>
+          <a:bodyPr>
+            <a:normAutofit fontScale="85000" lnSpcReduction="20000"/>
+          </a:bodyPr>
           <a:lstStyle/>
           <a:p>
-            <a:endParaRPr lang="fr-LU"/>
-          </a:p>
-        </p:txBody>
-      </p:sp>
-    </p:spTree>
-    <p:extLst>
-      <p:ext uri="{BB962C8B-B14F-4D97-AF65-F5344CB8AC3E}">
-        <p14:creationId xmlns:p14="http://schemas.microsoft.com/office/powerpoint/2010/main" val="2429169769"/>
-      </p:ext>
-    </p:extLst>
-  </p:cSld>
-  <p:clrMapOvr>
-    <a:masterClrMapping/>
-  </p:clrMapOvr>
-</p:sld>
-</file>
-
-<file path=ppt/slides/slide15.xml><?xml version="1.0" encoding="utf-8"?>
-<p:sld xmlns:a="http://schemas.openxmlformats.org/drawingml/2006/main" xmlns:r="http://schemas.openxmlformats.org/officeDocument/2006/relationships" xmlns:p="http://schemas.openxmlformats.org/presentationml/2006/main">
-  <p:cSld>
-    <p:spTree>
-      <p:nvGrpSpPr>
-        <p:cNvPr id="1" name=""/>
-        <p:cNvGrpSpPr/>
-        <p:nvPr/>
-      </p:nvGrpSpPr>
-      <p:grpSpPr>
-        <a:xfrm>
-          <a:off x="0" y="0"/>
-          <a:ext cx="0" cy="0"/>
-          <a:chOff x="0" y="0"/>
-          <a:chExt cx="0" cy="0"/>
-        </a:xfrm>
-      </p:grpSpPr>
-      <p:sp>
-        <p:nvSpPr>
-          <p:cNvPr id="2" name="Titel 1">
-            <a:extLst>
-              <a:ext uri="{FF2B5EF4-FFF2-40B4-BE49-F238E27FC236}">
-                <a16:creationId xmlns:a16="http://schemas.microsoft.com/office/drawing/2014/main" id="{B1879587-B17B-A420-C1F2-4E951611127F}"/>
-              </a:ext>
-            </a:extLst>
-          </p:cNvPr>
-          <p:cNvSpPr>
-            <a:spLocks noGrp="1"/>
-          </p:cNvSpPr>
-          <p:nvPr>
-            <p:ph type="title"/>
-          </p:nvPr>
-        </p:nvSpPr>
-        <p:spPr/>
-        <p:txBody>
-          <a:bodyPr/>
-          <a:lstStyle/>
-          <a:p>
-            <a:pPr algn="ctr"/>
-            <a:r>
-              <a:rPr lang="fr-LU" dirty="0"/>
-              <a:t>Evaluation on </a:t>
-            </a:r>
-            <a:r>
-              <a:rPr lang="fr-LU" dirty="0" err="1"/>
-              <a:t>evaluation</a:t>
-            </a:r>
-            <a:r>
-              <a:rPr lang="fr-LU" dirty="0"/>
-              <a:t> set</a:t>
-            </a:r>
-            <a:br>
-              <a:rPr lang="fr-LU" dirty="0"/>
-            </a:br>
-            <a:r>
-              <a:rPr lang="fr-LU" sz="2000" dirty="0"/>
-              <a:t>07:30-08:30</a:t>
-            </a:r>
-          </a:p>
-        </p:txBody>
-      </p:sp>
-      <p:sp>
-        <p:nvSpPr>
-          <p:cNvPr id="3" name="Inhaltsplatzhalter 2">
-            <a:extLst>
-              <a:ext uri="{FF2B5EF4-FFF2-40B4-BE49-F238E27FC236}">
-                <a16:creationId xmlns:a16="http://schemas.microsoft.com/office/drawing/2014/main" id="{8AF2C04B-39FF-2CDA-DDF8-02B581BA28C1}"/>
-              </a:ext>
-            </a:extLst>
-          </p:cNvPr>
-          <p:cNvSpPr>
-            <a:spLocks noGrp="1"/>
-          </p:cNvSpPr>
-          <p:nvPr>
-            <p:ph idx="1"/>
-          </p:nvPr>
-        </p:nvSpPr>
-        <p:spPr/>
-        <p:txBody>
-          <a:bodyPr/>
-          <a:lstStyle/>
+            <a:r>
+              <a:rPr lang="fr-LU" dirty="0"/>
+              <a:t>MAE:</a:t>
+            </a:r>
+          </a:p>
           <a:p>
             <a:endParaRPr lang="fr-LU" dirty="0"/>
           </a:p>
-        </p:txBody>
-      </p:sp>
+          <a:p>
+            <a:endParaRPr lang="fr-LU" dirty="0"/>
+          </a:p>
+          <a:p>
+            <a:endParaRPr lang="fr-LU" dirty="0"/>
+          </a:p>
+          <a:p>
+            <a:endParaRPr lang="fr-LU" dirty="0"/>
+          </a:p>
+          <a:p>
+            <a:endParaRPr lang="fr-LU" dirty="0"/>
+          </a:p>
+          <a:p>
+            <a:endParaRPr lang="fr-LU" dirty="0"/>
+          </a:p>
+          <a:p>
+            <a:endParaRPr lang="fr-LU" dirty="0"/>
+          </a:p>
+          <a:p>
+            <a:endParaRPr lang="fr-LU" dirty="0"/>
+          </a:p>
+          <a:p>
+            <a:pPr marL="0" indent="0">
+              <a:buNone/>
+            </a:pPr>
+            <a:r>
+              <a:rPr lang="fr-LU" dirty="0">
+                <a:sym typeface="Wingdings" panose="05000000000000000000" pitchFamily="2" charset="2"/>
+              </a:rPr>
+              <a:t></a:t>
+            </a:r>
+            <a:r>
+              <a:rPr lang="fr-LU" dirty="0" err="1">
+                <a:sym typeface="Wingdings" panose="05000000000000000000" pitchFamily="2" charset="2"/>
+              </a:rPr>
+              <a:t>same</a:t>
+            </a:r>
+            <a:r>
+              <a:rPr lang="fr-LU" dirty="0">
+                <a:sym typeface="Wingdings" panose="05000000000000000000" pitchFamily="2" charset="2"/>
+              </a:rPr>
+              <a:t> portal </a:t>
+            </a:r>
+            <a:r>
+              <a:rPr lang="fr-LU" dirty="0" err="1">
+                <a:sym typeface="Wingdings" panose="05000000000000000000" pitchFamily="2" charset="2"/>
+              </a:rPr>
+              <a:t>sensor</a:t>
+            </a:r>
+            <a:r>
+              <a:rPr lang="fr-LU" dirty="0">
+                <a:sym typeface="Wingdings" panose="05000000000000000000" pitchFamily="2" charset="2"/>
+              </a:rPr>
+              <a:t> are </a:t>
+            </a:r>
+            <a:r>
+              <a:rPr lang="fr-LU" dirty="0" err="1">
+                <a:sym typeface="Wingdings" panose="05000000000000000000" pitchFamily="2" charset="2"/>
+              </a:rPr>
+              <a:t>better</a:t>
+            </a:r>
+            <a:r>
+              <a:rPr lang="fr-LU" dirty="0">
+                <a:sym typeface="Wingdings" panose="05000000000000000000" pitchFamily="2" charset="2"/>
+              </a:rPr>
+              <a:t> for </a:t>
+            </a:r>
+            <a:r>
+              <a:rPr lang="fr-LU" dirty="0" err="1">
+                <a:sym typeface="Wingdings" panose="05000000000000000000" pitchFamily="2" charset="2"/>
+              </a:rPr>
+              <a:t>prediction</a:t>
+            </a:r>
+            <a:endParaRPr lang="fr-LU" dirty="0">
+              <a:sym typeface="Wingdings" panose="05000000000000000000" pitchFamily="2" charset="2"/>
+            </a:endParaRPr>
+          </a:p>
+          <a:p>
+            <a:pPr marL="0" indent="0">
+              <a:buNone/>
+            </a:pPr>
+            <a:r>
+              <a:rPr lang="fr-LU" dirty="0">
+                <a:sym typeface="Wingdings" panose="05000000000000000000" pitchFamily="2" charset="2"/>
+              </a:rPr>
+              <a:t></a:t>
+            </a:r>
+            <a:r>
+              <a:rPr lang="fr-LU" dirty="0" err="1">
+                <a:sym typeface="Wingdings" panose="05000000000000000000" pitchFamily="2" charset="2"/>
+              </a:rPr>
+              <a:t>XGBoost</a:t>
+            </a:r>
+            <a:r>
+              <a:rPr lang="fr-LU" dirty="0">
+                <a:sym typeface="Wingdings" panose="05000000000000000000" pitchFamily="2" charset="2"/>
+              </a:rPr>
+              <a:t> </a:t>
+            </a:r>
+            <a:r>
+              <a:rPr lang="fr-LU" dirty="0" err="1">
+                <a:sym typeface="Wingdings" panose="05000000000000000000" pitchFamily="2" charset="2"/>
+              </a:rPr>
+              <a:t>gives</a:t>
+            </a:r>
+            <a:r>
+              <a:rPr lang="fr-LU" dirty="0">
+                <a:sym typeface="Wingdings" panose="05000000000000000000" pitchFamily="2" charset="2"/>
+              </a:rPr>
+              <a:t> best </a:t>
+            </a:r>
+            <a:r>
+              <a:rPr lang="fr-LU" dirty="0" err="1">
+                <a:sym typeface="Wingdings" panose="05000000000000000000" pitchFamily="2" charset="2"/>
+              </a:rPr>
+              <a:t>results</a:t>
+            </a:r>
+            <a:endParaRPr lang="fr-LU" dirty="0"/>
+          </a:p>
+          <a:p>
+            <a:endParaRPr lang="fr-LU" dirty="0"/>
+          </a:p>
+        </p:txBody>
+      </p:sp>
+      <p:graphicFrame>
+        <p:nvGraphicFramePr>
+          <p:cNvPr id="4" name="Tabelle 3">
+            <a:extLst>
+              <a:ext uri="{FF2B5EF4-FFF2-40B4-BE49-F238E27FC236}">
+                <a16:creationId xmlns:a16="http://schemas.microsoft.com/office/drawing/2014/main" id="{C45C87FA-811E-ACA4-ABCF-FE7E2271D542}"/>
+              </a:ext>
+            </a:extLst>
+          </p:cNvPr>
+          <p:cNvGraphicFramePr>
+            <a:graphicFrameLocks noGrp="1"/>
+          </p:cNvGraphicFramePr>
+          <p:nvPr>
+            <p:extLst>
+              <p:ext uri="{D42A27DB-BD31-4B8C-83A1-F6EECF244321}">
+                <p14:modId xmlns:p14="http://schemas.microsoft.com/office/powerpoint/2010/main" val="673898941"/>
+              </p:ext>
+            </p:extLst>
+          </p:nvPr>
+        </p:nvGraphicFramePr>
+        <p:xfrm>
+          <a:off x="2341418" y="2029690"/>
+          <a:ext cx="7416138" cy="2944092"/>
+        </p:xfrm>
+        <a:graphic>
+          <a:graphicData uri="http://schemas.openxmlformats.org/drawingml/2006/table">
+            <a:tbl>
+              <a:tblPr>
+                <a:tableStyleId>{5C22544A-7EE6-4342-B048-85BDC9FD1C3A}</a:tableStyleId>
+              </a:tblPr>
+              <a:tblGrid>
+                <a:gridCol w="1236023">
+                  <a:extLst>
+                    <a:ext uri="{9D8B030D-6E8A-4147-A177-3AD203B41FA5}">
+                      <a16:colId xmlns:a16="http://schemas.microsoft.com/office/drawing/2014/main" val="1038362545"/>
+                    </a:ext>
+                  </a:extLst>
+                </a:gridCol>
+                <a:gridCol w="1236023">
+                  <a:extLst>
+                    <a:ext uri="{9D8B030D-6E8A-4147-A177-3AD203B41FA5}">
+                      <a16:colId xmlns:a16="http://schemas.microsoft.com/office/drawing/2014/main" val="37696407"/>
+                    </a:ext>
+                  </a:extLst>
+                </a:gridCol>
+                <a:gridCol w="1236023">
+                  <a:extLst>
+                    <a:ext uri="{9D8B030D-6E8A-4147-A177-3AD203B41FA5}">
+                      <a16:colId xmlns:a16="http://schemas.microsoft.com/office/drawing/2014/main" val="1750653483"/>
+                    </a:ext>
+                  </a:extLst>
+                </a:gridCol>
+                <a:gridCol w="1236023">
+                  <a:extLst>
+                    <a:ext uri="{9D8B030D-6E8A-4147-A177-3AD203B41FA5}">
+                      <a16:colId xmlns:a16="http://schemas.microsoft.com/office/drawing/2014/main" val="2680574913"/>
+                    </a:ext>
+                  </a:extLst>
+                </a:gridCol>
+                <a:gridCol w="1236023">
+                  <a:extLst>
+                    <a:ext uri="{9D8B030D-6E8A-4147-A177-3AD203B41FA5}">
+                      <a16:colId xmlns:a16="http://schemas.microsoft.com/office/drawing/2014/main" val="574067018"/>
+                    </a:ext>
+                  </a:extLst>
+                </a:gridCol>
+                <a:gridCol w="1236023">
+                  <a:extLst>
+                    <a:ext uri="{9D8B030D-6E8A-4147-A177-3AD203B41FA5}">
+                      <a16:colId xmlns:a16="http://schemas.microsoft.com/office/drawing/2014/main" val="1447418831"/>
+                    </a:ext>
+                  </a:extLst>
+                </a:gridCol>
+              </a:tblGrid>
+              <a:tr h="981364">
+                <a:tc>
+                  <a:txBody>
+                    <a:bodyPr/>
+                    <a:lstStyle/>
+                    <a:p>
+                      <a:pPr algn="ctr" fontAlgn="b">
+                        <a:buNone/>
+                      </a:pPr>
+                      <a:endParaRPr lang="de-LU" sz="2000" b="0" i="0" u="none" strike="noStrike" dirty="0">
+                        <a:solidFill>
+                          <a:srgbClr val="000000"/>
+                        </a:solidFill>
+                        <a:effectLst/>
+                        <a:latin typeface="Aptos Narrow" panose="020B0004020202020204" pitchFamily="34" charset="0"/>
+                      </a:endParaRPr>
+                    </a:p>
+                  </a:txBody>
+                  <a:tcPr marL="6350" marR="6350" marT="6350" marB="0" anchor="b">
+                    <a:solidFill>
+                      <a:schemeClr val="tx2">
+                        <a:lumMod val="25000"/>
+                        <a:lumOff val="75000"/>
+                      </a:schemeClr>
+                    </a:solidFill>
+                  </a:tcPr>
+                </a:tc>
+                <a:tc>
+                  <a:txBody>
+                    <a:bodyPr/>
+                    <a:lstStyle/>
+                    <a:p>
+                      <a:pPr algn="ctr" fontAlgn="b">
+                        <a:buNone/>
+                      </a:pPr>
+                      <a:r>
+                        <a:rPr lang="de-LU" sz="2000" u="none" strike="noStrike" dirty="0">
+                          <a:effectLst/>
+                        </a:rPr>
+                        <a:t>Linear Regression</a:t>
+                      </a:r>
+                      <a:endParaRPr lang="de-LU" sz="2000" b="0" i="0" u="none" strike="noStrike" dirty="0">
+                        <a:solidFill>
+                          <a:srgbClr val="000000"/>
+                        </a:solidFill>
+                        <a:effectLst/>
+                        <a:latin typeface="Aptos Narrow" panose="020B0004020202020204" pitchFamily="34" charset="0"/>
+                      </a:endParaRPr>
+                    </a:p>
+                  </a:txBody>
+                  <a:tcPr marL="6350" marR="6350" marT="6350" marB="0" anchor="b">
+                    <a:solidFill>
+                      <a:schemeClr val="tx2">
+                        <a:lumMod val="25000"/>
+                        <a:lumOff val="75000"/>
+                      </a:schemeClr>
+                    </a:solidFill>
+                  </a:tcPr>
+                </a:tc>
+                <a:tc>
+                  <a:txBody>
+                    <a:bodyPr/>
+                    <a:lstStyle/>
+                    <a:p>
+                      <a:pPr algn="ctr" fontAlgn="b">
+                        <a:buNone/>
+                      </a:pPr>
+                      <a:r>
+                        <a:rPr lang="de-LU" sz="2000" u="none" strike="noStrike" dirty="0" err="1">
+                          <a:effectLst/>
+                        </a:rPr>
+                        <a:t>XGBoost</a:t>
+                      </a:r>
+                      <a:endParaRPr lang="de-LU" sz="2000" b="0" i="0" u="none" strike="noStrike" dirty="0">
+                        <a:solidFill>
+                          <a:srgbClr val="000000"/>
+                        </a:solidFill>
+                        <a:effectLst/>
+                        <a:latin typeface="Aptos Narrow" panose="020B0004020202020204" pitchFamily="34" charset="0"/>
+                      </a:endParaRPr>
+                    </a:p>
+                  </a:txBody>
+                  <a:tcPr marL="6350" marR="6350" marT="6350" marB="0" anchor="b">
+                    <a:solidFill>
+                      <a:schemeClr val="tx2">
+                        <a:lumMod val="25000"/>
+                        <a:lumOff val="75000"/>
+                      </a:schemeClr>
+                    </a:solidFill>
+                  </a:tcPr>
+                </a:tc>
+                <a:tc>
+                  <a:txBody>
+                    <a:bodyPr/>
+                    <a:lstStyle/>
+                    <a:p>
+                      <a:pPr algn="ctr" fontAlgn="b">
+                        <a:buNone/>
+                      </a:pPr>
+                      <a:r>
+                        <a:rPr lang="de-LU" sz="2000" u="none" strike="noStrike" dirty="0" err="1">
+                          <a:effectLst/>
+                        </a:rPr>
+                        <a:t>XGBoost-randomSearch</a:t>
+                      </a:r>
+                      <a:endParaRPr lang="de-LU" sz="2000" b="0" i="0" u="none" strike="noStrike" dirty="0">
+                        <a:solidFill>
+                          <a:srgbClr val="000000"/>
+                        </a:solidFill>
+                        <a:effectLst/>
+                        <a:latin typeface="Aptos Narrow" panose="020B0004020202020204" pitchFamily="34" charset="0"/>
+                      </a:endParaRPr>
+                    </a:p>
+                  </a:txBody>
+                  <a:tcPr marL="6350" marR="6350" marT="6350" marB="0" anchor="b">
+                    <a:solidFill>
+                      <a:schemeClr val="tx2">
+                        <a:lumMod val="25000"/>
+                        <a:lumOff val="75000"/>
+                      </a:schemeClr>
+                    </a:solidFill>
+                  </a:tcPr>
+                </a:tc>
+                <a:tc>
+                  <a:txBody>
+                    <a:bodyPr/>
+                    <a:lstStyle/>
+                    <a:p>
+                      <a:pPr algn="ctr" fontAlgn="b">
+                        <a:buNone/>
+                      </a:pPr>
+                      <a:r>
+                        <a:rPr lang="de-LU" sz="2000" u="none" strike="noStrike">
+                          <a:effectLst/>
+                        </a:rPr>
+                        <a:t>NN</a:t>
+                      </a:r>
+                      <a:endParaRPr lang="de-LU" sz="2000" b="0" i="0" u="none" strike="noStrike">
+                        <a:solidFill>
+                          <a:srgbClr val="000000"/>
+                        </a:solidFill>
+                        <a:effectLst/>
+                        <a:latin typeface="Aptos Narrow" panose="020B0004020202020204" pitchFamily="34" charset="0"/>
+                      </a:endParaRPr>
+                    </a:p>
+                  </a:txBody>
+                  <a:tcPr marL="6350" marR="6350" marT="6350" marB="0" anchor="b">
+                    <a:solidFill>
+                      <a:schemeClr val="tx2">
+                        <a:lumMod val="25000"/>
+                        <a:lumOff val="75000"/>
+                      </a:schemeClr>
+                    </a:solidFill>
+                  </a:tcPr>
+                </a:tc>
+                <a:tc>
+                  <a:txBody>
+                    <a:bodyPr/>
+                    <a:lstStyle/>
+                    <a:p>
+                      <a:pPr algn="ctr" fontAlgn="b">
+                        <a:buNone/>
+                      </a:pPr>
+                      <a:r>
+                        <a:rPr lang="de-LU" sz="2000" u="none" strike="noStrike">
+                          <a:effectLst/>
+                        </a:rPr>
+                        <a:t>NN-gridsearch</a:t>
+                      </a:r>
+                      <a:endParaRPr lang="de-LU" sz="2000" b="0" i="0" u="none" strike="noStrike">
+                        <a:solidFill>
+                          <a:srgbClr val="000000"/>
+                        </a:solidFill>
+                        <a:effectLst/>
+                        <a:latin typeface="Aptos Narrow" panose="020B0004020202020204" pitchFamily="34" charset="0"/>
+                      </a:endParaRPr>
+                    </a:p>
+                  </a:txBody>
+                  <a:tcPr marL="6350" marR="6350" marT="6350" marB="0" anchor="b">
+                    <a:solidFill>
+                      <a:schemeClr val="tx2">
+                        <a:lumMod val="25000"/>
+                        <a:lumOff val="75000"/>
+                      </a:schemeClr>
+                    </a:solidFill>
+                  </a:tcPr>
+                </a:tc>
+                <a:extLst>
+                  <a:ext uri="{0D108BD9-81ED-4DB2-BD59-A6C34878D82A}">
+                    <a16:rowId xmlns:a16="http://schemas.microsoft.com/office/drawing/2014/main" val="1008187616"/>
+                  </a:ext>
+                </a:extLst>
+              </a:tr>
+              <a:tr h="981364">
+                <a:tc>
+                  <a:txBody>
+                    <a:bodyPr/>
+                    <a:lstStyle/>
+                    <a:p>
+                      <a:pPr algn="ctr" fontAlgn="b">
+                        <a:buNone/>
+                      </a:pPr>
+                      <a:r>
+                        <a:rPr lang="de-LU" sz="2000" b="0" i="0" u="none" strike="noStrike" dirty="0">
+                          <a:solidFill>
+                            <a:srgbClr val="000000"/>
+                          </a:solidFill>
+                          <a:effectLst/>
+                          <a:latin typeface="Aptos Narrow" panose="020B0004020202020204" pitchFamily="34" charset="0"/>
+                        </a:rPr>
+                        <a:t>Same </a:t>
+                      </a:r>
+                      <a:r>
+                        <a:rPr lang="de-LU" sz="2000" b="0" i="0" u="none" strike="noStrike" dirty="0" err="1">
+                          <a:solidFill>
+                            <a:srgbClr val="000000"/>
+                          </a:solidFill>
+                          <a:effectLst/>
+                          <a:latin typeface="Aptos Narrow" panose="020B0004020202020204" pitchFamily="34" charset="0"/>
+                        </a:rPr>
+                        <a:t>portal</a:t>
+                      </a:r>
+                      <a:endParaRPr lang="de-LU" sz="2000" b="0" i="0" u="none" strike="noStrike" dirty="0">
+                        <a:solidFill>
+                          <a:srgbClr val="000000"/>
+                        </a:solidFill>
+                        <a:effectLst/>
+                        <a:latin typeface="Aptos Narrow" panose="020B0004020202020204" pitchFamily="34" charset="0"/>
+                      </a:endParaRPr>
+                    </a:p>
+                  </a:txBody>
+                  <a:tcPr marL="6350" marR="6350" marT="6350" marB="0" anchor="b">
+                    <a:solidFill>
+                      <a:schemeClr val="tx2">
+                        <a:lumMod val="25000"/>
+                        <a:lumOff val="75000"/>
+                      </a:schemeClr>
+                    </a:solidFill>
+                  </a:tcPr>
+                </a:tc>
+                <a:tc>
+                  <a:txBody>
+                    <a:bodyPr/>
+                    <a:lstStyle/>
+                    <a:p>
+                      <a:pPr algn="ctr" fontAlgn="b">
+                        <a:buNone/>
+                      </a:pPr>
+                      <a:r>
+                        <a:rPr lang="de-LU" sz="2000" u="none" strike="noStrike">
+                          <a:effectLst/>
+                        </a:rPr>
+                        <a:t>0,462</a:t>
+                      </a:r>
+                      <a:endParaRPr lang="de-LU" sz="2000" b="0" i="0" u="none" strike="noStrike">
+                        <a:solidFill>
+                          <a:srgbClr val="000000"/>
+                        </a:solidFill>
+                        <a:effectLst/>
+                        <a:latin typeface="Aptos Narrow" panose="020B0004020202020204" pitchFamily="34" charset="0"/>
+                      </a:endParaRPr>
+                    </a:p>
+                  </a:txBody>
+                  <a:tcPr marL="6350" marR="6350" marT="6350" marB="0" anchor="b"/>
+                </a:tc>
+                <a:tc>
+                  <a:txBody>
+                    <a:bodyPr/>
+                    <a:lstStyle/>
+                    <a:p>
+                      <a:pPr algn="ctr" fontAlgn="b">
+                        <a:buNone/>
+                      </a:pPr>
+                      <a:r>
+                        <a:rPr lang="de-LU" sz="2000" u="none" strike="noStrike">
+                          <a:effectLst/>
+                        </a:rPr>
+                        <a:t>0,401</a:t>
+                      </a:r>
+                      <a:endParaRPr lang="de-LU" sz="2000" b="0" i="0" u="none" strike="noStrike">
+                        <a:solidFill>
+                          <a:srgbClr val="000000"/>
+                        </a:solidFill>
+                        <a:effectLst/>
+                        <a:latin typeface="Aptos Narrow" panose="020B0004020202020204" pitchFamily="34" charset="0"/>
+                      </a:endParaRPr>
+                    </a:p>
+                  </a:txBody>
+                  <a:tcPr marL="6350" marR="6350" marT="6350" marB="0" anchor="b"/>
+                </a:tc>
+                <a:tc>
+                  <a:txBody>
+                    <a:bodyPr/>
+                    <a:lstStyle/>
+                    <a:p>
+                      <a:pPr algn="ctr" fontAlgn="b">
+                        <a:buNone/>
+                      </a:pPr>
+                      <a:r>
+                        <a:rPr lang="de-LU" sz="2000" u="none" strike="noStrike">
+                          <a:effectLst/>
+                        </a:rPr>
+                        <a:t>0,398</a:t>
+                      </a:r>
+                      <a:endParaRPr lang="de-LU" sz="2000" b="0" i="0" u="none" strike="noStrike">
+                        <a:solidFill>
+                          <a:srgbClr val="000000"/>
+                        </a:solidFill>
+                        <a:effectLst/>
+                        <a:latin typeface="Aptos Narrow" panose="020B0004020202020204" pitchFamily="34" charset="0"/>
+                      </a:endParaRPr>
+                    </a:p>
+                  </a:txBody>
+                  <a:tcPr marL="6350" marR="6350" marT="6350" marB="0" anchor="b"/>
+                </a:tc>
+                <a:tc>
+                  <a:txBody>
+                    <a:bodyPr/>
+                    <a:lstStyle/>
+                    <a:p>
+                      <a:pPr algn="ctr" fontAlgn="b">
+                        <a:buNone/>
+                      </a:pPr>
+                      <a:r>
+                        <a:rPr lang="de-LU" sz="2000" u="none" strike="noStrike">
+                          <a:effectLst/>
+                        </a:rPr>
+                        <a:t>0,42</a:t>
+                      </a:r>
+                      <a:endParaRPr lang="de-LU" sz="2000" b="0" i="0" u="none" strike="noStrike">
+                        <a:solidFill>
+                          <a:srgbClr val="000000"/>
+                        </a:solidFill>
+                        <a:effectLst/>
+                        <a:latin typeface="Aptos Narrow" panose="020B0004020202020204" pitchFamily="34" charset="0"/>
+                      </a:endParaRPr>
+                    </a:p>
+                  </a:txBody>
+                  <a:tcPr marL="6350" marR="6350" marT="6350" marB="0" anchor="b"/>
+                </a:tc>
+                <a:tc>
+                  <a:txBody>
+                    <a:bodyPr/>
+                    <a:lstStyle/>
+                    <a:p>
+                      <a:pPr algn="ctr" fontAlgn="b">
+                        <a:buNone/>
+                      </a:pPr>
+                      <a:r>
+                        <a:rPr lang="de-LU" sz="2000" u="none" strike="noStrike">
+                          <a:effectLst/>
+                        </a:rPr>
+                        <a:t>0,419</a:t>
+                      </a:r>
+                      <a:endParaRPr lang="de-LU" sz="2000" b="0" i="0" u="none" strike="noStrike">
+                        <a:solidFill>
+                          <a:srgbClr val="000000"/>
+                        </a:solidFill>
+                        <a:effectLst/>
+                        <a:latin typeface="Aptos Narrow" panose="020B0004020202020204" pitchFamily="34" charset="0"/>
+                      </a:endParaRPr>
+                    </a:p>
+                  </a:txBody>
+                  <a:tcPr marL="6350" marR="6350" marT="6350" marB="0" anchor="b"/>
+                </a:tc>
+                <a:extLst>
+                  <a:ext uri="{0D108BD9-81ED-4DB2-BD59-A6C34878D82A}">
+                    <a16:rowId xmlns:a16="http://schemas.microsoft.com/office/drawing/2014/main" val="831793282"/>
+                  </a:ext>
+                </a:extLst>
+              </a:tr>
+              <a:tr h="981364">
+                <a:tc>
+                  <a:txBody>
+                    <a:bodyPr/>
+                    <a:lstStyle/>
+                    <a:p>
+                      <a:pPr algn="ctr" fontAlgn="b">
+                        <a:buNone/>
+                      </a:pPr>
+                      <a:r>
+                        <a:rPr lang="de-LU" sz="2000" b="0" i="0" u="none" strike="noStrike" dirty="0" err="1">
+                          <a:solidFill>
+                            <a:srgbClr val="000000"/>
+                          </a:solidFill>
+                          <a:effectLst/>
+                          <a:latin typeface="Aptos Narrow" panose="020B0004020202020204" pitchFamily="34" charset="0"/>
+                        </a:rPr>
+                        <a:t>Neighbour</a:t>
+                      </a:r>
+                      <a:r>
+                        <a:rPr lang="de-LU" sz="2000" b="0" i="0" u="none" strike="noStrike" dirty="0">
+                          <a:solidFill>
+                            <a:srgbClr val="000000"/>
+                          </a:solidFill>
+                          <a:effectLst/>
+                          <a:latin typeface="Aptos Narrow" panose="020B0004020202020204" pitchFamily="34" charset="0"/>
+                        </a:rPr>
+                        <a:t> </a:t>
+                      </a:r>
+                      <a:r>
+                        <a:rPr lang="de-LU" sz="2000" b="0" i="0" u="none" strike="noStrike" dirty="0" err="1">
+                          <a:solidFill>
+                            <a:srgbClr val="000000"/>
+                          </a:solidFill>
+                          <a:effectLst/>
+                          <a:latin typeface="Aptos Narrow" panose="020B0004020202020204" pitchFamily="34" charset="0"/>
+                        </a:rPr>
+                        <a:t>portal</a:t>
+                      </a:r>
+                      <a:endParaRPr lang="de-LU" sz="2000" b="0" i="0" u="none" strike="noStrike" dirty="0">
+                        <a:solidFill>
+                          <a:srgbClr val="000000"/>
+                        </a:solidFill>
+                        <a:effectLst/>
+                        <a:latin typeface="Aptos Narrow" panose="020B0004020202020204" pitchFamily="34" charset="0"/>
+                      </a:endParaRPr>
+                    </a:p>
+                  </a:txBody>
+                  <a:tcPr marL="6350" marR="6350" marT="6350" marB="0" anchor="b">
+                    <a:solidFill>
+                      <a:schemeClr val="tx2">
+                        <a:lumMod val="25000"/>
+                        <a:lumOff val="75000"/>
+                      </a:schemeClr>
+                    </a:solidFill>
+                  </a:tcPr>
+                </a:tc>
+                <a:tc>
+                  <a:txBody>
+                    <a:bodyPr/>
+                    <a:lstStyle/>
+                    <a:p>
+                      <a:pPr algn="ctr" fontAlgn="b">
+                        <a:buNone/>
+                      </a:pPr>
+                      <a:r>
+                        <a:rPr lang="de-LU" sz="2000" u="none" strike="noStrike">
+                          <a:effectLst/>
+                        </a:rPr>
+                        <a:t>0,399</a:t>
+                      </a:r>
+                      <a:endParaRPr lang="de-LU" sz="2000" b="0" i="0" u="none" strike="noStrike">
+                        <a:solidFill>
+                          <a:srgbClr val="000000"/>
+                        </a:solidFill>
+                        <a:effectLst/>
+                        <a:latin typeface="Aptos Narrow" panose="020B0004020202020204" pitchFamily="34" charset="0"/>
+                      </a:endParaRPr>
+                    </a:p>
+                  </a:txBody>
+                  <a:tcPr marL="6350" marR="6350" marT="6350" marB="0" anchor="b"/>
+                </a:tc>
+                <a:tc>
+                  <a:txBody>
+                    <a:bodyPr/>
+                    <a:lstStyle/>
+                    <a:p>
+                      <a:pPr algn="ctr" fontAlgn="b">
+                        <a:buNone/>
+                      </a:pPr>
+                      <a:r>
+                        <a:rPr lang="de-LU" sz="2000" u="none" strike="noStrike" dirty="0">
+                          <a:effectLst/>
+                        </a:rPr>
+                        <a:t>0,424</a:t>
+                      </a:r>
+                      <a:endParaRPr lang="de-LU" sz="2000" b="0" i="0" u="none" strike="noStrike" dirty="0">
+                        <a:solidFill>
+                          <a:srgbClr val="000000"/>
+                        </a:solidFill>
+                        <a:effectLst/>
+                        <a:latin typeface="Aptos Narrow" panose="020B0004020202020204" pitchFamily="34" charset="0"/>
+                      </a:endParaRPr>
+                    </a:p>
+                  </a:txBody>
+                  <a:tcPr marL="6350" marR="6350" marT="6350" marB="0" anchor="b"/>
+                </a:tc>
+                <a:tc>
+                  <a:txBody>
+                    <a:bodyPr/>
+                    <a:lstStyle/>
+                    <a:p>
+                      <a:pPr algn="ctr" fontAlgn="b">
+                        <a:buNone/>
+                      </a:pPr>
+                      <a:r>
+                        <a:rPr lang="de-LU" sz="2000" u="none" strike="noStrike">
+                          <a:effectLst/>
+                        </a:rPr>
+                        <a:t>0,42</a:t>
+                      </a:r>
+                      <a:endParaRPr lang="de-LU" sz="2000" b="0" i="0" u="none" strike="noStrike">
+                        <a:solidFill>
+                          <a:srgbClr val="000000"/>
+                        </a:solidFill>
+                        <a:effectLst/>
+                        <a:latin typeface="Aptos Narrow" panose="020B0004020202020204" pitchFamily="34" charset="0"/>
+                      </a:endParaRPr>
+                    </a:p>
+                  </a:txBody>
+                  <a:tcPr marL="6350" marR="6350" marT="6350" marB="0" anchor="b"/>
+                </a:tc>
+                <a:tc>
+                  <a:txBody>
+                    <a:bodyPr/>
+                    <a:lstStyle/>
+                    <a:p>
+                      <a:pPr algn="ctr" fontAlgn="b">
+                        <a:buNone/>
+                      </a:pPr>
+                      <a:r>
+                        <a:rPr lang="de-LU" sz="2000" u="none" strike="noStrike">
+                          <a:effectLst/>
+                        </a:rPr>
+                        <a:t>0,444</a:t>
+                      </a:r>
+                      <a:endParaRPr lang="de-LU" sz="2000" b="0" i="0" u="none" strike="noStrike">
+                        <a:solidFill>
+                          <a:srgbClr val="000000"/>
+                        </a:solidFill>
+                        <a:effectLst/>
+                        <a:latin typeface="Aptos Narrow" panose="020B0004020202020204" pitchFamily="34" charset="0"/>
+                      </a:endParaRPr>
+                    </a:p>
+                  </a:txBody>
+                  <a:tcPr marL="6350" marR="6350" marT="6350" marB="0" anchor="b"/>
+                </a:tc>
+                <a:tc>
+                  <a:txBody>
+                    <a:bodyPr/>
+                    <a:lstStyle/>
+                    <a:p>
+                      <a:pPr algn="ctr" fontAlgn="b">
+                        <a:buNone/>
+                      </a:pPr>
+                      <a:r>
+                        <a:rPr lang="de-LU" sz="2000" u="none" strike="noStrike" dirty="0">
+                          <a:effectLst/>
+                        </a:rPr>
+                        <a:t>0,437</a:t>
+                      </a:r>
+                      <a:endParaRPr lang="de-LU" sz="2000" b="0" i="0" u="none" strike="noStrike" dirty="0">
+                        <a:solidFill>
+                          <a:srgbClr val="000000"/>
+                        </a:solidFill>
+                        <a:effectLst/>
+                        <a:latin typeface="Aptos Narrow" panose="020B0004020202020204" pitchFamily="34" charset="0"/>
+                      </a:endParaRPr>
+                    </a:p>
+                  </a:txBody>
+                  <a:tcPr marL="6350" marR="6350" marT="6350" marB="0" anchor="b"/>
+                </a:tc>
+                <a:extLst>
+                  <a:ext uri="{0D108BD9-81ED-4DB2-BD59-A6C34878D82A}">
+                    <a16:rowId xmlns:a16="http://schemas.microsoft.com/office/drawing/2014/main" val="3421751153"/>
+                  </a:ext>
+                </a:extLst>
+              </a:tr>
+            </a:tbl>
+          </a:graphicData>
+        </a:graphic>
+      </p:graphicFrame>
     </p:spTree>
     <p:extLst>
       <p:ext uri="{BB962C8B-B14F-4D97-AF65-F5344CB8AC3E}">
@@ -4101,7 +5514,7 @@
 </p:sld>
 </file>
 
-<file path=ppt/slides/slide16.xml><?xml version="1.0" encoding="utf-8"?>
+<file path=ppt/slides/slide15.xml><?xml version="1.0" encoding="utf-8"?>
 <p:sld xmlns:a="http://schemas.openxmlformats.org/drawingml/2006/main" xmlns:r="http://schemas.openxmlformats.org/officeDocument/2006/relationships" xmlns:p="http://schemas.openxmlformats.org/presentationml/2006/main">
   <p:cSld>
     <p:spTree>
@@ -4168,12 +5581,84 @@
           </a:p>
         </p:txBody>
       </p:sp>
-      <p:sp>
-        <p:nvSpPr>
-          <p:cNvPr id="3" name="Inhaltsplatzhalter 2">
-            <a:extLst>
-              <a:ext uri="{FF2B5EF4-FFF2-40B4-BE49-F238E27FC236}">
-                <a16:creationId xmlns:a16="http://schemas.microsoft.com/office/drawing/2014/main" id="{4FE55828-22AD-2EC9-18A6-998FF86493F3}"/>
+      <p:pic>
+        <p:nvPicPr>
+          <p:cNvPr id="7" name="Grafik 6">
+            <a:extLst>
+              <a:ext uri="{FF2B5EF4-FFF2-40B4-BE49-F238E27FC236}">
+                <a16:creationId xmlns:a16="http://schemas.microsoft.com/office/drawing/2014/main" id="{55EC24D9-8D58-F849-2C27-EE1C6A987CF2}"/>
+              </a:ext>
+            </a:extLst>
+          </p:cNvPr>
+          <p:cNvPicPr>
+            <a:picLocks noChangeAspect="1"/>
+          </p:cNvPicPr>
+          <p:nvPr/>
+        </p:nvPicPr>
+        <p:blipFill>
+          <a:blip r:embed="rId2">
+            <a:extLst>
+              <a:ext uri="{28A0092B-C50C-407E-A947-70E740481C1C}">
+                <a14:useLocalDpi xmlns:a14="http://schemas.microsoft.com/office/drawing/2010/main" val="0"/>
+              </a:ext>
+            </a:extLst>
+          </a:blip>
+          <a:stretch>
+            <a:fillRect/>
+          </a:stretch>
+        </p:blipFill>
+        <p:spPr>
+          <a:xfrm>
+            <a:off x="8869167" y="2463897"/>
+            <a:ext cx="3322833" cy="3322833"/>
+          </a:xfrm>
+          <a:prstGeom prst="rect">
+            <a:avLst/>
+          </a:prstGeom>
+        </p:spPr>
+      </p:pic>
+      <p:pic>
+        <p:nvPicPr>
+          <p:cNvPr id="9" name="Grafik 8">
+            <a:extLst>
+              <a:ext uri="{FF2B5EF4-FFF2-40B4-BE49-F238E27FC236}">
+                <a16:creationId xmlns:a16="http://schemas.microsoft.com/office/drawing/2014/main" id="{849D4CA6-F65A-33AE-2D99-C18FE8DA130C}"/>
+              </a:ext>
+            </a:extLst>
+          </p:cNvPr>
+          <p:cNvPicPr>
+            <a:picLocks noChangeAspect="1"/>
+          </p:cNvPicPr>
+          <p:nvPr/>
+        </p:nvPicPr>
+        <p:blipFill>
+          <a:blip r:embed="rId3">
+            <a:extLst>
+              <a:ext uri="{28A0092B-C50C-407E-A947-70E740481C1C}">
+                <a14:useLocalDpi xmlns:a14="http://schemas.microsoft.com/office/drawing/2010/main" val="0"/>
+              </a:ext>
+            </a:extLst>
+          </a:blip>
+          <a:stretch>
+            <a:fillRect/>
+          </a:stretch>
+        </p:blipFill>
+        <p:spPr>
+          <a:xfrm>
+            <a:off x="5546334" y="2463897"/>
+            <a:ext cx="3322833" cy="3322833"/>
+          </a:xfrm>
+          <a:prstGeom prst="rect">
+            <a:avLst/>
+          </a:prstGeom>
+        </p:spPr>
+      </p:pic>
+      <p:sp>
+        <p:nvSpPr>
+          <p:cNvPr id="11" name="Inhaltsplatzhalter 10">
+            <a:extLst>
+              <a:ext uri="{FF2B5EF4-FFF2-40B4-BE49-F238E27FC236}">
+                <a16:creationId xmlns:a16="http://schemas.microsoft.com/office/drawing/2014/main" id="{64C0BA3D-6B8F-F9AB-9750-C992D88CFDC3}"/>
               </a:ext>
             </a:extLst>
           </p:cNvPr>
@@ -4184,19 +5669,441 @@
             <p:ph idx="1"/>
           </p:nvPr>
         </p:nvSpPr>
-        <p:spPr/>
-        <p:txBody>
-          <a:bodyPr/>
+        <p:spPr>
+          <a:xfrm>
+            <a:off x="838200" y="1825625"/>
+            <a:ext cx="4710545" cy="2136775"/>
+          </a:xfrm>
+        </p:spPr>
+        <p:txBody>
+          <a:bodyPr>
+            <a:normAutofit lnSpcReduction="10000"/>
+          </a:bodyPr>
           <a:lstStyle/>
           <a:p>
+            <a:r>
+              <a:rPr lang="fr-LU" dirty="0"/>
+              <a:t>Flow: </a:t>
+            </a:r>
+            <a:r>
+              <a:rPr lang="fr-LU" dirty="0" err="1"/>
+              <a:t>prediction</a:t>
+            </a:r>
+            <a:r>
+              <a:rPr lang="fr-LU" dirty="0"/>
+              <a:t> of </a:t>
+            </a:r>
+            <a:r>
+              <a:rPr lang="fr-LU" dirty="0" err="1"/>
+              <a:t>neighbouring</a:t>
+            </a:r>
+            <a:r>
+              <a:rPr lang="fr-LU" dirty="0"/>
+              <a:t> </a:t>
+            </a:r>
+            <a:r>
+              <a:rPr lang="fr-LU" dirty="0" err="1"/>
+              <a:t>sensors</a:t>
+            </a:r>
+            <a:r>
+              <a:rPr lang="fr-LU" dirty="0"/>
+              <a:t> </a:t>
+            </a:r>
+            <a:r>
+              <a:rPr lang="fr-LU" dirty="0" err="1"/>
+              <a:t>is</a:t>
+            </a:r>
+            <a:r>
+              <a:rPr lang="fr-LU" dirty="0"/>
+              <a:t> </a:t>
+            </a:r>
+            <a:r>
+              <a:rPr lang="fr-LU" dirty="0" err="1"/>
+              <a:t>better</a:t>
+            </a:r>
             <a:endParaRPr lang="fr-LU" dirty="0"/>
           </a:p>
-        </p:txBody>
-      </p:sp>
+          <a:p>
+            <a:r>
+              <a:rPr lang="fr-LU" dirty="0"/>
+              <a:t>Speed: </a:t>
+            </a:r>
+            <a:r>
+              <a:rPr lang="fr-LU" dirty="0" err="1"/>
+              <a:t>prediction</a:t>
+            </a:r>
+            <a:r>
+              <a:rPr lang="fr-LU" dirty="0"/>
+              <a:t> of </a:t>
+            </a:r>
+            <a:r>
+              <a:rPr lang="fr-LU" dirty="0" err="1"/>
+              <a:t>same</a:t>
+            </a:r>
+            <a:r>
+              <a:rPr lang="fr-LU" dirty="0"/>
+              <a:t> portal </a:t>
+            </a:r>
+            <a:r>
+              <a:rPr lang="fr-LU" dirty="0" err="1"/>
+              <a:t>sensors</a:t>
+            </a:r>
+            <a:r>
+              <a:rPr lang="fr-LU" dirty="0"/>
+              <a:t> </a:t>
+            </a:r>
+            <a:r>
+              <a:rPr lang="fr-LU" dirty="0" err="1"/>
+              <a:t>is</a:t>
+            </a:r>
+            <a:r>
+              <a:rPr lang="fr-LU" dirty="0"/>
+              <a:t> </a:t>
+            </a:r>
+            <a:r>
+              <a:rPr lang="fr-LU" dirty="0" err="1"/>
+              <a:t>better</a:t>
+            </a:r>
+            <a:endParaRPr lang="fr-LU" dirty="0"/>
+          </a:p>
+        </p:txBody>
+      </p:sp>
+      <p:pic>
+        <p:nvPicPr>
+          <p:cNvPr id="13" name="Grafik 12">
+            <a:extLst>
+              <a:ext uri="{FF2B5EF4-FFF2-40B4-BE49-F238E27FC236}">
+                <a16:creationId xmlns:a16="http://schemas.microsoft.com/office/drawing/2014/main" id="{0406836B-F318-9899-2C6C-D99071496822}"/>
+              </a:ext>
+            </a:extLst>
+          </p:cNvPr>
+          <p:cNvPicPr>
+            <a:picLocks noChangeAspect="1"/>
+          </p:cNvPicPr>
+          <p:nvPr/>
+        </p:nvPicPr>
+        <p:blipFill>
+          <a:blip r:embed="rId4"/>
+          <a:stretch>
+            <a:fillRect/>
+          </a:stretch>
+        </p:blipFill>
+        <p:spPr>
+          <a:xfrm>
+            <a:off x="838200" y="4287987"/>
+            <a:ext cx="4412679" cy="1951762"/>
+          </a:xfrm>
+          <a:prstGeom prst="rect">
+            <a:avLst/>
+          </a:prstGeom>
+        </p:spPr>
+      </p:pic>
     </p:spTree>
     <p:extLst>
       <p:ext uri="{BB962C8B-B14F-4D97-AF65-F5344CB8AC3E}">
         <p14:creationId xmlns:p14="http://schemas.microsoft.com/office/powerpoint/2010/main" val="2795961209"/>
+      </p:ext>
+    </p:extLst>
+  </p:cSld>
+  <p:clrMapOvr>
+    <a:masterClrMapping/>
+  </p:clrMapOvr>
+</p:sld>
+</file>
+
+<file path=ppt/slides/slide16.xml><?xml version="1.0" encoding="utf-8"?>
+<p:sld xmlns:a="http://schemas.openxmlformats.org/drawingml/2006/main" xmlns:r="http://schemas.openxmlformats.org/officeDocument/2006/relationships" xmlns:p="http://schemas.openxmlformats.org/presentationml/2006/main">
+  <p:cSld>
+    <p:spTree>
+      <p:nvGrpSpPr>
+        <p:cNvPr id="1" name="">
+          <a:extLst>
+            <a:ext uri="{FF2B5EF4-FFF2-40B4-BE49-F238E27FC236}">
+              <a16:creationId xmlns:a16="http://schemas.microsoft.com/office/drawing/2014/main" id="{59DD0E57-C97A-398B-ACD7-BB9457047ECB}"/>
+            </a:ext>
+          </a:extLst>
+        </p:cNvPr>
+        <p:cNvGrpSpPr/>
+        <p:nvPr/>
+      </p:nvGrpSpPr>
+      <p:grpSpPr>
+        <a:xfrm>
+          <a:off x="0" y="0"/>
+          <a:ext cx="0" cy="0"/>
+          <a:chOff x="0" y="0"/>
+          <a:chExt cx="0" cy="0"/>
+        </a:xfrm>
+      </p:grpSpPr>
+      <p:sp>
+        <p:nvSpPr>
+          <p:cNvPr id="2" name="Titel 1">
+            <a:extLst>
+              <a:ext uri="{FF2B5EF4-FFF2-40B4-BE49-F238E27FC236}">
+                <a16:creationId xmlns:a16="http://schemas.microsoft.com/office/drawing/2014/main" id="{6B357DC9-AD02-F342-51E7-E906A2D54BDF}"/>
+              </a:ext>
+            </a:extLst>
+          </p:cNvPr>
+          <p:cNvSpPr>
+            <a:spLocks noGrp="1"/>
+          </p:cNvSpPr>
+          <p:nvPr>
+            <p:ph type="title"/>
+          </p:nvPr>
+        </p:nvSpPr>
+        <p:spPr/>
+        <p:txBody>
+          <a:bodyPr/>
+          <a:lstStyle/>
+          <a:p>
+            <a:pPr algn="ctr"/>
+            <a:r>
+              <a:rPr lang="fr-LU" dirty="0"/>
+              <a:t>Evaluation vs </a:t>
+            </a:r>
+            <a:r>
+              <a:rPr lang="fr-LU" dirty="0" err="1"/>
+              <a:t>Testset</a:t>
+            </a:r>
+            <a:r>
+              <a:rPr lang="fr-LU" dirty="0"/>
+              <a:t>:</a:t>
+            </a:r>
+            <a:br>
+              <a:rPr lang="fr-LU" dirty="0"/>
+            </a:br>
+            <a:endParaRPr lang="fr-LU" sz="2000" dirty="0"/>
+          </a:p>
+        </p:txBody>
+      </p:sp>
+      <p:sp>
+        <p:nvSpPr>
+          <p:cNvPr id="3" name="Inhaltsplatzhalter 2">
+            <a:extLst>
+              <a:ext uri="{FF2B5EF4-FFF2-40B4-BE49-F238E27FC236}">
+                <a16:creationId xmlns:a16="http://schemas.microsoft.com/office/drawing/2014/main" id="{B138ECE4-3E1C-351A-C1BE-F836F3B55404}"/>
+              </a:ext>
+            </a:extLst>
+          </p:cNvPr>
+          <p:cNvSpPr>
+            <a:spLocks noGrp="1"/>
+          </p:cNvSpPr>
+          <p:nvPr>
+            <p:ph idx="1"/>
+          </p:nvPr>
+        </p:nvSpPr>
+        <p:spPr>
+          <a:xfrm>
+            <a:off x="838200" y="1825625"/>
+            <a:ext cx="10515600" cy="4351338"/>
+          </a:xfrm>
+        </p:spPr>
+        <p:txBody>
+          <a:bodyPr/>
+          <a:lstStyle/>
+          <a:p>
+            <a:r>
+              <a:rPr lang="fr-LU" dirty="0"/>
+              <a:t>No </a:t>
+            </a:r>
+            <a:r>
+              <a:rPr lang="fr-LU" dirty="0" err="1"/>
+              <a:t>significant</a:t>
+            </a:r>
+            <a:r>
+              <a:rPr lang="fr-LU" dirty="0"/>
+              <a:t> drop </a:t>
+            </a:r>
+            <a:r>
+              <a:rPr lang="fr-LU" dirty="0" err="1"/>
+              <a:t>between</a:t>
+            </a:r>
+            <a:r>
+              <a:rPr lang="fr-LU" dirty="0"/>
+              <a:t> the test and </a:t>
+            </a:r>
+            <a:r>
+              <a:rPr lang="fr-LU" dirty="0" err="1"/>
+              <a:t>evaluation</a:t>
+            </a:r>
+            <a:r>
+              <a:rPr lang="fr-LU" dirty="0"/>
+              <a:t> set </a:t>
+            </a:r>
+          </a:p>
+          <a:p>
+            <a:endParaRPr lang="fr-LU" dirty="0"/>
+          </a:p>
+          <a:p>
+            <a:endParaRPr lang="fr-LU" dirty="0"/>
+          </a:p>
+        </p:txBody>
+      </p:sp>
+      <p:pic>
+        <p:nvPicPr>
+          <p:cNvPr id="6" name="Grafik 5">
+            <a:extLst>
+              <a:ext uri="{FF2B5EF4-FFF2-40B4-BE49-F238E27FC236}">
+                <a16:creationId xmlns:a16="http://schemas.microsoft.com/office/drawing/2014/main" id="{F5CE42D6-9978-6F56-D28E-F7D3AC4407B3}"/>
+              </a:ext>
+            </a:extLst>
+          </p:cNvPr>
+          <p:cNvPicPr>
+            <a:picLocks noChangeAspect="1"/>
+          </p:cNvPicPr>
+          <p:nvPr/>
+        </p:nvPicPr>
+        <p:blipFill>
+          <a:blip r:embed="rId2"/>
+          <a:stretch>
+            <a:fillRect/>
+          </a:stretch>
+        </p:blipFill>
+        <p:spPr>
+          <a:xfrm>
+            <a:off x="6630557" y="3899850"/>
+            <a:ext cx="4412679" cy="1951762"/>
+          </a:xfrm>
+          <a:prstGeom prst="rect">
+            <a:avLst/>
+          </a:prstGeom>
+        </p:spPr>
+      </p:pic>
+      <p:sp>
+        <p:nvSpPr>
+          <p:cNvPr id="8" name="Textfeld 7">
+            <a:extLst>
+              <a:ext uri="{FF2B5EF4-FFF2-40B4-BE49-F238E27FC236}">
+                <a16:creationId xmlns:a16="http://schemas.microsoft.com/office/drawing/2014/main" id="{B1B8C817-7BEB-5614-46E3-F864C9373C9F}"/>
+              </a:ext>
+            </a:extLst>
+          </p:cNvPr>
+          <p:cNvSpPr txBox="1"/>
+          <p:nvPr/>
+        </p:nvSpPr>
+        <p:spPr>
+          <a:xfrm>
+            <a:off x="7086601" y="3299706"/>
+            <a:ext cx="3657599" cy="369332"/>
+          </a:xfrm>
+          <a:prstGeom prst="rect">
+            <a:avLst/>
+          </a:prstGeom>
+          <a:noFill/>
+        </p:spPr>
+        <p:txBody>
+          <a:bodyPr wrap="square" rtlCol="0">
+            <a:spAutoFit/>
+          </a:bodyPr>
+          <a:lstStyle/>
+          <a:p>
+            <a:r>
+              <a:rPr lang="fr-LU" dirty="0"/>
+              <a:t>Performance on new </a:t>
+            </a:r>
+            <a:r>
+              <a:rPr lang="fr-LU" dirty="0" err="1"/>
+              <a:t>unseen</a:t>
+            </a:r>
+            <a:r>
+              <a:rPr lang="fr-LU" dirty="0"/>
+              <a:t> data</a:t>
+            </a:r>
+          </a:p>
+        </p:txBody>
+      </p:sp>
+      <p:sp>
+        <p:nvSpPr>
+          <p:cNvPr id="10" name="Textfeld 9">
+            <a:extLst>
+              <a:ext uri="{FF2B5EF4-FFF2-40B4-BE49-F238E27FC236}">
+                <a16:creationId xmlns:a16="http://schemas.microsoft.com/office/drawing/2014/main" id="{D2C0BA56-6E46-C0FB-B286-AA2AFBDB3F8D}"/>
+              </a:ext>
+            </a:extLst>
+          </p:cNvPr>
+          <p:cNvSpPr txBox="1"/>
+          <p:nvPr/>
+        </p:nvSpPr>
+        <p:spPr>
+          <a:xfrm>
+            <a:off x="1995055" y="3345873"/>
+            <a:ext cx="3322933" cy="646331"/>
+          </a:xfrm>
+          <a:prstGeom prst="rect">
+            <a:avLst/>
+          </a:prstGeom>
+          <a:noFill/>
+        </p:spPr>
+        <p:txBody>
+          <a:bodyPr wrap="square" rtlCol="0">
+            <a:spAutoFit/>
+          </a:bodyPr>
+          <a:lstStyle/>
+          <a:p>
+            <a:r>
+              <a:rPr lang="fr-LU" dirty="0"/>
+              <a:t>Performance on </a:t>
+            </a:r>
+            <a:r>
+              <a:rPr lang="fr-LU" dirty="0" err="1"/>
+              <a:t>Testset</a:t>
+            </a:r>
+            <a:r>
+              <a:rPr lang="fr-LU" dirty="0"/>
+              <a:t> </a:t>
+            </a:r>
+            <a:r>
+              <a:rPr lang="fr-LU" dirty="0" err="1"/>
+              <a:t>from</a:t>
+            </a:r>
+            <a:r>
+              <a:rPr lang="fr-LU" dirty="0"/>
+              <a:t> Train/test </a:t>
+            </a:r>
+            <a:r>
+              <a:rPr lang="fr-LU" dirty="0" err="1"/>
+              <a:t>random</a:t>
+            </a:r>
+            <a:r>
+              <a:rPr lang="fr-LU" dirty="0"/>
+              <a:t> split</a:t>
+            </a:r>
+          </a:p>
+        </p:txBody>
+      </p:sp>
+      <p:pic>
+        <p:nvPicPr>
+          <p:cNvPr id="14" name="Grafik 13">
+            <a:extLst>
+              <a:ext uri="{FF2B5EF4-FFF2-40B4-BE49-F238E27FC236}">
+                <a16:creationId xmlns:a16="http://schemas.microsoft.com/office/drawing/2014/main" id="{CA5BAAD0-D086-8923-8C91-B4D17571A961}"/>
+              </a:ext>
+            </a:extLst>
+          </p:cNvPr>
+          <p:cNvPicPr>
+            <a:picLocks noChangeAspect="1"/>
+          </p:cNvPicPr>
+          <p:nvPr/>
+        </p:nvPicPr>
+        <p:blipFill>
+          <a:blip r:embed="rId3"/>
+          <a:stretch>
+            <a:fillRect/>
+          </a:stretch>
+        </p:blipFill>
+        <p:spPr>
+          <a:xfrm>
+            <a:off x="1240140" y="4062901"/>
+            <a:ext cx="3934374" cy="1667108"/>
+          </a:xfrm>
+          <a:prstGeom prst="rect">
+            <a:avLst/>
+          </a:prstGeom>
+        </p:spPr>
+      </p:pic>
+    </p:spTree>
+    <p:extLst>
+      <p:ext uri="{BB962C8B-B14F-4D97-AF65-F5344CB8AC3E}">
+        <p14:creationId xmlns:p14="http://schemas.microsoft.com/office/powerpoint/2010/main" val="1963972495"/>
       </p:ext>
     </p:extLst>
   </p:cSld>
@@ -4784,7 +6691,7 @@
             </a:r>
             <a:r>
               <a:rPr lang="fr-LU" dirty="0" err="1"/>
-              <a:t>sensorss</a:t>
+              <a:t>sensors</a:t>
             </a:r>
             <a:endParaRPr lang="fr-LU" dirty="0"/>
           </a:p>
@@ -4980,7 +6887,7 @@
             </a:r>
             <a:r>
               <a:rPr lang="fr-LU" dirty="0" err="1"/>
-              <a:t>Sensors</a:t>
+              <a:t>sensors</a:t>
             </a:r>
             <a:endParaRPr lang="fr-LU" dirty="0"/>
           </a:p>

</xml_diff>